<commit_message>
W01 replace glht with lsmeans
</commit_message>
<xml_diff>
--- a/slides/introduction_2019.pptx
+++ b/slides/introduction_2019.pptx
@@ -13151,7 +13151,7 @@
             </a:pPr>
             <a:r>
               <a:rPr lang="en"/>
-              <a:t>Lecture 1 : Introduction to Generalised Linear Models (E</a:t>
+              <a:t>Lecture 1 : Linear models revisited (E</a:t>
             </a:r>
             <a:r>
               <a:rPr lang="en"/>
@@ -14072,7 +14072,7 @@
             <a:tbl>
               <a:tblPr bandRow="1" firstRow="1">
                 <a:noFill/>
-                <a:tableStyleId>{91F9E172-C8A2-4B07-BDE9-68640F5CBB25}</a:tableStyleId>
+                <a:tableStyleId>{90150ECB-AF38-4C2B-80C6-1B4EB340931C}</a:tableStyleId>
               </a:tblPr>
               <a:tblGrid>
                 <a:gridCol w="1201400"/>
@@ -26657,7 +26657,7 @@
         <p:spPr>
           <a:xfrm>
             <a:off x="311700" y="1152475"/>
-            <a:ext cx="8520600" cy="3815700"/>
+            <a:ext cx="8520600" cy="3132300"/>
           </a:xfrm>
           <a:prstGeom prst="rect">
             <a:avLst/>
@@ -26674,103 +26674,13 @@
                 <a:spcPts val="0"/>
               </a:spcBef>
               <a:spcAft>
-                <a:spcPts val="0"/>
+                <a:spcPts val="1600"/>
               </a:spcAft>
               <a:buNone/>
             </a:pPr>
             <a:r>
               <a:rPr lang="en"/>
               <a:t>Extendable! These are particular cases but a linear models include any number of continuous and categorical explanatory variables. </a:t>
-            </a:r>
-            <a:endParaRPr/>
-          </a:p>
-          <a:p>
-            <a:pPr indent="0" lvl="0" marL="0" rtl="0" algn="l">
-              <a:spcBef>
-                <a:spcPts val="1600"/>
-              </a:spcBef>
-              <a:spcAft>
-                <a:spcPts val="0"/>
-              </a:spcAft>
-              <a:buNone/>
-            </a:pPr>
-            <a:r>
-              <a:t/>
-            </a:r>
-            <a:endParaRPr/>
-          </a:p>
-          <a:p>
-            <a:pPr indent="0" lvl="0" marL="0" rtl="0" algn="l">
-              <a:spcBef>
-                <a:spcPts val="1600"/>
-              </a:spcBef>
-              <a:spcAft>
-                <a:spcPts val="0"/>
-              </a:spcAft>
-              <a:buNone/>
-            </a:pPr>
-            <a:r>
-              <a:t/>
-            </a:r>
-            <a:endParaRPr/>
-          </a:p>
-          <a:p>
-            <a:pPr indent="0" lvl="0" marL="0" rtl="0" algn="l">
-              <a:spcBef>
-                <a:spcPts val="1600"/>
-              </a:spcBef>
-              <a:spcAft>
-                <a:spcPts val="0"/>
-              </a:spcAft>
-              <a:buNone/>
-            </a:pPr>
-            <a:r>
-              <a:t/>
-            </a:r>
-            <a:endParaRPr/>
-          </a:p>
-          <a:p>
-            <a:pPr indent="0" lvl="0" marL="0" rtl="0" algn="l">
-              <a:spcBef>
-                <a:spcPts val="1600"/>
-              </a:spcBef>
-              <a:spcAft>
-                <a:spcPts val="0"/>
-              </a:spcAft>
-              <a:buNone/>
-            </a:pPr>
-            <a:r>
-              <a:t/>
-            </a:r>
-            <a:endParaRPr/>
-          </a:p>
-          <a:p>
-            <a:pPr indent="0" lvl="0" marL="0" rtl="0" algn="l">
-              <a:spcBef>
-                <a:spcPts val="1600"/>
-              </a:spcBef>
-              <a:spcAft>
-                <a:spcPts val="0"/>
-              </a:spcAft>
-              <a:buNone/>
-            </a:pPr>
-            <a:r>
-              <a:t/>
-            </a:r>
-            <a:endParaRPr/>
-          </a:p>
-          <a:p>
-            <a:pPr indent="0" lvl="0" marL="0" rtl="0" algn="l">
-              <a:spcBef>
-                <a:spcPts val="1600"/>
-              </a:spcBef>
-              <a:spcAft>
-                <a:spcPts val="1600"/>
-              </a:spcAft>
-              <a:buNone/>
-            </a:pPr>
-            <a:r>
-              <a:t/>
             </a:r>
             <a:endParaRPr/>
           </a:p>
@@ -26831,7 +26741,7 @@
             <a:tbl>
               <a:tblPr bandRow="1" firstRow="1">
                 <a:noFill/>
-                <a:tableStyleId>{91F9E172-C8A2-4B07-BDE9-68640F5CBB25}</a:tableStyleId>
+                <a:tableStyleId>{90150ECB-AF38-4C2B-80C6-1B4EB340931C}</a:tableStyleId>
               </a:tblPr>
               <a:tblGrid>
                 <a:gridCol w="1201400"/>
@@ -28140,7 +28050,7 @@
             <a:tbl>
               <a:tblPr bandRow="1" firstRow="1">
                 <a:noFill/>
-                <a:tableStyleId>{91F9E172-C8A2-4B07-BDE9-68640F5CBB25}</a:tableStyleId>
+                <a:tableStyleId>{90150ECB-AF38-4C2B-80C6-1B4EB340931C}</a:tableStyleId>
               </a:tblPr>
               <a:tblGrid>
                 <a:gridCol w="1201400"/>
@@ -30237,7 +30147,7 @@
             </a:r>
             <a:r>
               <a:rPr lang="en"/>
-              <a:t>Express competency in Experimental Design and Bioscience Techniques (and elsewhere).</a:t>
+              <a:t>Express competency in Experimental Design and Bioscience Techniques (and elsewhere). There is no additional assessment.</a:t>
             </a:r>
             <a:endParaRPr/>
           </a:p>
@@ -34875,9 +34785,23 @@
             </a:pPr>
             <a:r>
               <a:rPr lang="en"/>
-              <a:t>Usual steps in applying lm()</a:t>
-            </a:r>
-            <a:endParaRPr/>
+              <a:t>Usual steps in applying </a:t>
+            </a:r>
+            <a:r>
+              <a:rPr lang="en">
+                <a:latin typeface="Consolas"/>
+                <a:ea typeface="Consolas"/>
+                <a:cs typeface="Consolas"/>
+                <a:sym typeface="Consolas"/>
+              </a:rPr>
+              <a:t>lm()</a:t>
+            </a:r>
+            <a:endParaRPr>
+              <a:latin typeface="Consolas"/>
+              <a:ea typeface="Consolas"/>
+              <a:cs typeface="Consolas"/>
+              <a:sym typeface="Consolas"/>
+            </a:endParaRPr>
           </a:p>
         </p:txBody>
       </p:sp>
@@ -35457,28 +35381,52 @@
               <a:buNone/>
             </a:pPr>
             <a:r>
+              <a:rPr lang="en">
+                <a:latin typeface="Consolas"/>
+                <a:ea typeface="Consolas"/>
+                <a:cs typeface="Consolas"/>
+                <a:sym typeface="Consolas"/>
+              </a:rPr>
+              <a:t>lm()</a:t>
+            </a:r>
+            <a:endParaRPr>
+              <a:latin typeface="Consolas"/>
+              <a:ea typeface="Consolas"/>
+              <a:cs typeface="Consolas"/>
+              <a:sym typeface="Consolas"/>
+            </a:endParaRPr>
+          </a:p>
+          <a:p>
+            <a:pPr indent="0" lvl="0" marL="0" rtl="0" algn="l">
+              <a:spcBef>
+                <a:spcPts val="1600"/>
+              </a:spcBef>
+              <a:spcAft>
+                <a:spcPts val="0"/>
+              </a:spcAft>
+              <a:buNone/>
+            </a:pPr>
+            <a:r>
+              <a:rPr lang="en">
+                <a:latin typeface="Consolas"/>
+                <a:ea typeface="Consolas"/>
+                <a:cs typeface="Consolas"/>
+                <a:sym typeface="Consolas"/>
+              </a:rPr>
+              <a:t>s</a:t>
+            </a:r>
+            <a:r>
+              <a:rPr lang="en">
+                <a:latin typeface="Consolas"/>
+                <a:ea typeface="Consolas"/>
+                <a:cs typeface="Consolas"/>
+                <a:sym typeface="Consolas"/>
+              </a:rPr>
+              <a:t>ummary(mod1)</a:t>
+            </a:r>
+            <a:r>
               <a:rPr lang="en"/>
-              <a:t>lm()</a:t>
-            </a:r>
-            <a:endParaRPr/>
-          </a:p>
-          <a:p>
-            <a:pPr indent="0" lvl="0" marL="0" rtl="0" algn="l">
-              <a:spcBef>
-                <a:spcPts val="1600"/>
-              </a:spcBef>
-              <a:spcAft>
-                <a:spcPts val="0"/>
-              </a:spcAft>
-              <a:buNone/>
-            </a:pPr>
-            <a:r>
-              <a:rPr lang="en"/>
-              <a:t>s</a:t>
-            </a:r>
-            <a:r>
-              <a:rPr lang="en"/>
-              <a:t>ummary(mod1) - ‘estimates’ and direction of effects</a:t>
+              <a:t> - ‘estimates’ and direction of effects</a:t>
             </a:r>
             <a:endParaRPr/>
           </a:p>
@@ -35605,9 +35553,23 @@
             </a:pPr>
             <a:r>
               <a:rPr lang="en"/>
-              <a:t>Usual steps in applying lm()</a:t>
-            </a:r>
-            <a:endParaRPr/>
+              <a:t>Usual steps in applying </a:t>
+            </a:r>
+            <a:r>
+              <a:rPr lang="en">
+                <a:latin typeface="Consolas"/>
+                <a:ea typeface="Consolas"/>
+                <a:cs typeface="Consolas"/>
+                <a:sym typeface="Consolas"/>
+              </a:rPr>
+              <a:t>lm()</a:t>
+            </a:r>
+            <a:endParaRPr>
+              <a:latin typeface="Consolas"/>
+              <a:ea typeface="Consolas"/>
+              <a:cs typeface="Consolas"/>
+              <a:sym typeface="Consolas"/>
+            </a:endParaRPr>
           </a:p>
         </p:txBody>
       </p:sp>
@@ -36075,8 +36037,17 @@
               <a:buNone/>
             </a:pPr>
             <a:r>
+              <a:rPr lang="en">
+                <a:latin typeface="Consolas"/>
+                <a:ea typeface="Consolas"/>
+                <a:cs typeface="Consolas"/>
+                <a:sym typeface="Consolas"/>
+              </a:rPr>
+              <a:t>anova(mod1)</a:t>
+            </a:r>
+            <a:r>
               <a:rPr lang="en"/>
-              <a:t>anova(mod1) </a:t>
+              <a:t> </a:t>
             </a:r>
             <a:endParaRPr/>
           </a:p>
@@ -36132,43 +36103,13 @@
                 <a:spcPts val="1600"/>
               </a:spcBef>
               <a:spcAft>
-                <a:spcPts val="0"/>
+                <a:spcPts val="1600"/>
               </a:spcAft>
               <a:buNone/>
             </a:pPr>
             <a:r>
               <a:rPr lang="en"/>
               <a:t>For reference: it’s also how to compare models</a:t>
-            </a:r>
-            <a:endParaRPr/>
-          </a:p>
-          <a:p>
-            <a:pPr indent="0" lvl="0" marL="0" rtl="0" algn="l">
-              <a:spcBef>
-                <a:spcPts val="1600"/>
-              </a:spcBef>
-              <a:spcAft>
-                <a:spcPts val="0"/>
-              </a:spcAft>
-              <a:buNone/>
-            </a:pPr>
-            <a:r>
-              <a:t/>
-            </a:r>
-            <a:endParaRPr/>
-          </a:p>
-          <a:p>
-            <a:pPr indent="0" lvl="0" marL="0" rtl="0" algn="l">
-              <a:spcBef>
-                <a:spcPts val="1600"/>
-              </a:spcBef>
-              <a:spcAft>
-                <a:spcPts val="1600"/>
-              </a:spcAft>
-              <a:buNone/>
-            </a:pPr>
-            <a:r>
-              <a:t/>
             </a:r>
             <a:endParaRPr/>
           </a:p>
@@ -36233,9 +36174,23 @@
             </a:pPr>
             <a:r>
               <a:rPr lang="en"/>
-              <a:t>Usual steps in applying lm()</a:t>
-            </a:r>
-            <a:endParaRPr/>
+              <a:t>Usual steps in applying </a:t>
+            </a:r>
+            <a:r>
+              <a:rPr lang="en">
+                <a:latin typeface="Consolas"/>
+                <a:ea typeface="Consolas"/>
+                <a:cs typeface="Consolas"/>
+                <a:sym typeface="Consolas"/>
+              </a:rPr>
+              <a:t>lm()</a:t>
+            </a:r>
+            <a:endParaRPr>
+              <a:latin typeface="Consolas"/>
+              <a:ea typeface="Consolas"/>
+              <a:cs typeface="Consolas"/>
+              <a:sym typeface="Consolas"/>
+            </a:endParaRPr>
           </a:p>
         </p:txBody>
       </p:sp>
@@ -36288,7 +36243,7 @@
         <p:spPr>
           <a:xfrm>
             <a:off x="3173400" y="1093925"/>
-            <a:ext cx="5871600" cy="3416400"/>
+            <a:ext cx="5871600" cy="1877700"/>
           </a:xfrm>
           <a:prstGeom prst="rect">
             <a:avLst/>
@@ -36331,7 +36286,7 @@
                 <a:cs typeface="Droid Sans Mono"/>
                 <a:sym typeface="Droid Sans Mono"/>
               </a:rPr>
-              <a:t>library(multcomp)</a:t>
+              <a:t>library(lsmeans)</a:t>
             </a:r>
             <a:endParaRPr sz="900">
               <a:solidFill>
@@ -36363,7 +36318,7 @@
                 <a:cs typeface="Droid Sans Mono"/>
                 <a:sym typeface="Droid Sans Mono"/>
               </a:rPr>
-              <a:t>post &lt;- glht(mod1, linfct = mcp(medium = "Tukey"))</a:t>
+              <a:t>post &lt;- lsmeans(mod1, ~ medium)</a:t>
             </a:r>
             <a:endParaRPr sz="900">
               <a:solidFill>
@@ -36395,7 +36350,19 @@
                 <a:cs typeface="Droid Sans Mono"/>
                 <a:sym typeface="Droid Sans Mono"/>
               </a:rPr>
-              <a:t>summary(post)</a:t>
+              <a:t>pairs</a:t>
+            </a:r>
+            <a:r>
+              <a:rPr lang="en" sz="900">
+                <a:solidFill>
+                  <a:srgbClr val="0000FF"/>
+                </a:solidFill>
+                <a:latin typeface="Droid Sans Mono"/>
+                <a:ea typeface="Droid Sans Mono"/>
+                <a:cs typeface="Droid Sans Mono"/>
+                <a:sym typeface="Droid Sans Mono"/>
+              </a:rPr>
+              <a:t>(post)</a:t>
             </a:r>
             <a:endParaRPr sz="900">
               <a:solidFill>
@@ -36460,7 +36427,7 @@
                 <a:cs typeface="Droid Sans Mono"/>
                 <a:sym typeface="Droid Sans Mono"/>
               </a:rPr>
-              <a:t>	 Simultaneous Tests for General Linear Hypotheses</a:t>
+              <a:t> contrast                              estimate    SE df t.ratio p.value</a:t>
             </a:r>
             <a:endParaRPr sz="900">
               <a:solidFill>
@@ -36488,7 +36455,16 @@
               <a:buNone/>
             </a:pPr>
             <a:r>
-              <a:t/>
+              <a:rPr lang="en" sz="900">
+                <a:solidFill>
+                  <a:schemeClr val="dk1"/>
+                </a:solidFill>
+                <a:latin typeface="Droid Sans Mono"/>
+                <a:ea typeface="Droid Sans Mono"/>
+                <a:cs typeface="Droid Sans Mono"/>
+                <a:sym typeface="Droid Sans Mono"/>
+              </a:rPr>
+              <a:t> control - with sugar                     -0.17 0.414 27 -0.410  0.9117 </a:t>
             </a:r>
             <a:endParaRPr sz="900">
               <a:solidFill>
@@ -36525,7 +36501,7 @@
                 <a:cs typeface="Droid Sans Mono"/>
                 <a:sym typeface="Droid Sans Mono"/>
               </a:rPr>
-              <a:t>Multiple Comparisons of Means: Tukey Contrasts</a:t>
+              <a:t> control - with sugar + amino acids       -1.33 0.414 27 -3.212  0.0092 </a:t>
             </a:r>
             <a:endParaRPr sz="900">
               <a:solidFill>
@@ -36553,7 +36529,16 @@
               <a:buNone/>
             </a:pPr>
             <a:r>
-              <a:t/>
+              <a:rPr lang="en" sz="900">
+                <a:solidFill>
+                  <a:schemeClr val="dk1"/>
+                </a:solidFill>
+                <a:latin typeface="Droid Sans Mono"/>
+                <a:ea typeface="Droid Sans Mono"/>
+                <a:cs typeface="Droid Sans Mono"/>
+                <a:sym typeface="Droid Sans Mono"/>
+              </a:rPr>
+              <a:t> with sugar - with sugar + amino acids    -1.16 0.414 27 -2.802  0.0244 </a:t>
             </a:r>
             <a:endParaRPr sz="900">
               <a:solidFill>
@@ -36618,7 +36603,7 @@
                 <a:cs typeface="Droid Sans Mono"/>
                 <a:sym typeface="Droid Sans Mono"/>
               </a:rPr>
-              <a:t>Fit: lm(formula = diameter ~ medium, data = culture)</a:t>
+              <a:t>P value adjustment: tukey method for comparing a family of 3 estimates </a:t>
             </a:r>
             <a:endParaRPr sz="900">
               <a:solidFill>
@@ -36643,325 +36628,6 @@
               </a:buClr>
               <a:buSzPts val="1100"/>
               <a:buFont typeface="Arial"/>
-              <a:buNone/>
-            </a:pPr>
-            <a:r>
-              <a:t/>
-            </a:r>
-            <a:endParaRPr sz="900">
-              <a:solidFill>
-                <a:schemeClr val="dk1"/>
-              </a:solidFill>
-              <a:latin typeface="Droid Sans Mono"/>
-              <a:ea typeface="Droid Sans Mono"/>
-              <a:cs typeface="Droid Sans Mono"/>
-              <a:sym typeface="Droid Sans Mono"/>
-            </a:endParaRPr>
-          </a:p>
-          <a:p>
-            <a:pPr indent="0" lvl="0" marL="0" marR="0" rtl="0" algn="l">
-              <a:spcBef>
-                <a:spcPts val="0"/>
-              </a:spcBef>
-              <a:spcAft>
-                <a:spcPts val="0"/>
-              </a:spcAft>
-              <a:buClr>
-                <a:schemeClr val="dk1"/>
-              </a:buClr>
-              <a:buSzPts val="1100"/>
-              <a:buFont typeface="Arial"/>
-              <a:buNone/>
-            </a:pPr>
-            <a:r>
-              <a:rPr lang="en" sz="900">
-                <a:solidFill>
-                  <a:schemeClr val="dk1"/>
-                </a:solidFill>
-                <a:latin typeface="Droid Sans Mono"/>
-                <a:ea typeface="Droid Sans Mono"/>
-                <a:cs typeface="Droid Sans Mono"/>
-                <a:sym typeface="Droid Sans Mono"/>
-              </a:rPr>
-              <a:t>Linear Hypotheses:</a:t>
-            </a:r>
-            <a:endParaRPr sz="900">
-              <a:solidFill>
-                <a:schemeClr val="dk1"/>
-              </a:solidFill>
-              <a:latin typeface="Droid Sans Mono"/>
-              <a:ea typeface="Droid Sans Mono"/>
-              <a:cs typeface="Droid Sans Mono"/>
-              <a:sym typeface="Droid Sans Mono"/>
-            </a:endParaRPr>
-          </a:p>
-          <a:p>
-            <a:pPr indent="0" lvl="0" marL="0" marR="0" rtl="0" algn="l">
-              <a:spcBef>
-                <a:spcPts val="0"/>
-              </a:spcBef>
-              <a:spcAft>
-                <a:spcPts val="0"/>
-              </a:spcAft>
-              <a:buClr>
-                <a:schemeClr val="dk1"/>
-              </a:buClr>
-              <a:buSzPts val="1100"/>
-              <a:buFont typeface="Arial"/>
-              <a:buNone/>
-            </a:pPr>
-            <a:r>
-              <a:rPr lang="en" sz="900">
-                <a:solidFill>
-                  <a:schemeClr val="dk1"/>
-                </a:solidFill>
-                <a:latin typeface="Droid Sans Mono"/>
-                <a:ea typeface="Droid Sans Mono"/>
-                <a:cs typeface="Droid Sans Mono"/>
-                <a:sym typeface="Droid Sans Mono"/>
-              </a:rPr>
-              <a:t>                                           Estimate Std. Error t value Pr(&gt;|t|)   </a:t>
-            </a:r>
-            <a:endParaRPr sz="900">
-              <a:solidFill>
-                <a:schemeClr val="dk1"/>
-              </a:solidFill>
-              <a:latin typeface="Droid Sans Mono"/>
-              <a:ea typeface="Droid Sans Mono"/>
-              <a:cs typeface="Droid Sans Mono"/>
-              <a:sym typeface="Droid Sans Mono"/>
-            </a:endParaRPr>
-          </a:p>
-          <a:p>
-            <a:pPr indent="0" lvl="0" marL="0" marR="0" rtl="0" algn="l">
-              <a:spcBef>
-                <a:spcPts val="0"/>
-              </a:spcBef>
-              <a:spcAft>
-                <a:spcPts val="0"/>
-              </a:spcAft>
-              <a:buClr>
-                <a:schemeClr val="dk1"/>
-              </a:buClr>
-              <a:buSzPts val="1100"/>
-              <a:buFont typeface="Arial"/>
-              <a:buNone/>
-            </a:pPr>
-            <a:r>
-              <a:rPr lang="en" sz="900">
-                <a:solidFill>
-                  <a:schemeClr val="dk1"/>
-                </a:solidFill>
-                <a:latin typeface="Droid Sans Mono"/>
-                <a:ea typeface="Droid Sans Mono"/>
-                <a:cs typeface="Droid Sans Mono"/>
-                <a:sym typeface="Droid Sans Mono"/>
-              </a:rPr>
-              <a:t>with sugar - control == 0                    0.1700     0.4143   0.410  0.91168   </a:t>
-            </a:r>
-            <a:endParaRPr sz="900">
-              <a:solidFill>
-                <a:schemeClr val="dk1"/>
-              </a:solidFill>
-              <a:latin typeface="Droid Sans Mono"/>
-              <a:ea typeface="Droid Sans Mono"/>
-              <a:cs typeface="Droid Sans Mono"/>
-              <a:sym typeface="Droid Sans Mono"/>
-            </a:endParaRPr>
-          </a:p>
-          <a:p>
-            <a:pPr indent="0" lvl="0" marL="0" marR="0" rtl="0" algn="l">
-              <a:spcBef>
-                <a:spcPts val="0"/>
-              </a:spcBef>
-              <a:spcAft>
-                <a:spcPts val="0"/>
-              </a:spcAft>
-              <a:buClr>
-                <a:schemeClr val="dk1"/>
-              </a:buClr>
-              <a:buSzPts val="1100"/>
-              <a:buFont typeface="Arial"/>
-              <a:buNone/>
-            </a:pPr>
-            <a:r>
-              <a:rPr lang="en" sz="900">
-                <a:solidFill>
-                  <a:schemeClr val="dk1"/>
-                </a:solidFill>
-                <a:latin typeface="Droid Sans Mono"/>
-                <a:ea typeface="Droid Sans Mono"/>
-                <a:cs typeface="Droid Sans Mono"/>
-                <a:sym typeface="Droid Sans Mono"/>
-              </a:rPr>
-              <a:t>with sugar + amino acids - control == 0      1.3310     0.4143   3.212  0.00912 **</a:t>
-            </a:r>
-            <a:endParaRPr sz="900">
-              <a:solidFill>
-                <a:schemeClr val="dk1"/>
-              </a:solidFill>
-              <a:latin typeface="Droid Sans Mono"/>
-              <a:ea typeface="Droid Sans Mono"/>
-              <a:cs typeface="Droid Sans Mono"/>
-              <a:sym typeface="Droid Sans Mono"/>
-            </a:endParaRPr>
-          </a:p>
-          <a:p>
-            <a:pPr indent="0" lvl="0" marL="0" marR="0" rtl="0" algn="l">
-              <a:spcBef>
-                <a:spcPts val="0"/>
-              </a:spcBef>
-              <a:spcAft>
-                <a:spcPts val="0"/>
-              </a:spcAft>
-              <a:buClr>
-                <a:schemeClr val="dk1"/>
-              </a:buClr>
-              <a:buSzPts val="1100"/>
-              <a:buFont typeface="Arial"/>
-              <a:buNone/>
-            </a:pPr>
-            <a:r>
-              <a:rPr lang="en" sz="900">
-                <a:solidFill>
-                  <a:schemeClr val="dk1"/>
-                </a:solidFill>
-                <a:latin typeface="Droid Sans Mono"/>
-                <a:ea typeface="Droid Sans Mono"/>
-                <a:cs typeface="Droid Sans Mono"/>
-                <a:sym typeface="Droid Sans Mono"/>
-              </a:rPr>
-              <a:t>with sugar + amino acids - with sugar == 0   1.1610     0.4143   2.802  0.02442 * </a:t>
-            </a:r>
-            <a:endParaRPr sz="900">
-              <a:solidFill>
-                <a:schemeClr val="dk1"/>
-              </a:solidFill>
-              <a:latin typeface="Droid Sans Mono"/>
-              <a:ea typeface="Droid Sans Mono"/>
-              <a:cs typeface="Droid Sans Mono"/>
-              <a:sym typeface="Droid Sans Mono"/>
-            </a:endParaRPr>
-          </a:p>
-          <a:p>
-            <a:pPr indent="0" lvl="0" marL="0" marR="0" rtl="0" algn="l">
-              <a:spcBef>
-                <a:spcPts val="0"/>
-              </a:spcBef>
-              <a:spcAft>
-                <a:spcPts val="0"/>
-              </a:spcAft>
-              <a:buClr>
-                <a:schemeClr val="dk1"/>
-              </a:buClr>
-              <a:buSzPts val="1100"/>
-              <a:buFont typeface="Arial"/>
-              <a:buNone/>
-            </a:pPr>
-            <a:r>
-              <a:rPr lang="en" sz="900">
-                <a:solidFill>
-                  <a:schemeClr val="dk1"/>
-                </a:solidFill>
-                <a:latin typeface="Droid Sans Mono"/>
-                <a:ea typeface="Droid Sans Mono"/>
-                <a:cs typeface="Droid Sans Mono"/>
-                <a:sym typeface="Droid Sans Mono"/>
-              </a:rPr>
-              <a:t>---</a:t>
-            </a:r>
-            <a:endParaRPr sz="900">
-              <a:solidFill>
-                <a:schemeClr val="dk1"/>
-              </a:solidFill>
-              <a:latin typeface="Droid Sans Mono"/>
-              <a:ea typeface="Droid Sans Mono"/>
-              <a:cs typeface="Droid Sans Mono"/>
-              <a:sym typeface="Droid Sans Mono"/>
-            </a:endParaRPr>
-          </a:p>
-          <a:p>
-            <a:pPr indent="0" lvl="0" marL="0" marR="0" rtl="0" algn="l">
-              <a:spcBef>
-                <a:spcPts val="0"/>
-              </a:spcBef>
-              <a:spcAft>
-                <a:spcPts val="0"/>
-              </a:spcAft>
-              <a:buClr>
-                <a:schemeClr val="dk1"/>
-              </a:buClr>
-              <a:buSzPts val="1100"/>
-              <a:buFont typeface="Arial"/>
-              <a:buNone/>
-            </a:pPr>
-            <a:r>
-              <a:rPr lang="en" sz="900">
-                <a:solidFill>
-                  <a:schemeClr val="dk1"/>
-                </a:solidFill>
-                <a:latin typeface="Droid Sans Mono"/>
-                <a:ea typeface="Droid Sans Mono"/>
-                <a:cs typeface="Droid Sans Mono"/>
-                <a:sym typeface="Droid Sans Mono"/>
-              </a:rPr>
-              <a:t>Signif. codes:  0 ‘***’ 0.001 ‘**’ 0.01 ‘*’ 0.05 ‘.’ 0.1 ‘ ’ 1</a:t>
-            </a:r>
-            <a:endParaRPr sz="900">
-              <a:solidFill>
-                <a:schemeClr val="dk1"/>
-              </a:solidFill>
-              <a:latin typeface="Droid Sans Mono"/>
-              <a:ea typeface="Droid Sans Mono"/>
-              <a:cs typeface="Droid Sans Mono"/>
-              <a:sym typeface="Droid Sans Mono"/>
-            </a:endParaRPr>
-          </a:p>
-          <a:p>
-            <a:pPr indent="0" lvl="0" marL="0" marR="0" rtl="0" algn="l">
-              <a:spcBef>
-                <a:spcPts val="0"/>
-              </a:spcBef>
-              <a:spcAft>
-                <a:spcPts val="0"/>
-              </a:spcAft>
-              <a:buClr>
-                <a:schemeClr val="dk1"/>
-              </a:buClr>
-              <a:buSzPts val="1100"/>
-              <a:buFont typeface="Arial"/>
-              <a:buNone/>
-            </a:pPr>
-            <a:r>
-              <a:rPr lang="en" sz="900">
-                <a:solidFill>
-                  <a:schemeClr val="dk1"/>
-                </a:solidFill>
-                <a:latin typeface="Droid Sans Mono"/>
-                <a:ea typeface="Droid Sans Mono"/>
-                <a:cs typeface="Droid Sans Mono"/>
-                <a:sym typeface="Droid Sans Mono"/>
-              </a:rPr>
-              <a:t>(Adjusted p values reported -- single-step method)</a:t>
-            </a:r>
-            <a:endParaRPr sz="900">
-              <a:solidFill>
-                <a:schemeClr val="dk1"/>
-              </a:solidFill>
-              <a:latin typeface="Droid Sans Mono"/>
-              <a:ea typeface="Droid Sans Mono"/>
-              <a:cs typeface="Droid Sans Mono"/>
-              <a:sym typeface="Droid Sans Mono"/>
-            </a:endParaRPr>
-          </a:p>
-          <a:p>
-            <a:pPr indent="0" lvl="0" marL="0" marR="0" rtl="0" algn="l">
-              <a:spcBef>
-                <a:spcPts val="0"/>
-              </a:spcBef>
-              <a:spcAft>
-                <a:spcPts val="0"/>
-              </a:spcAft>
               <a:buNone/>
             </a:pPr>
             <a:r>
@@ -37029,9 +36695,58 @@
             </a:pPr>
             <a:r>
               <a:rPr lang="en"/>
-              <a:t>Use glht() from package multcomp</a:t>
-            </a:r>
-            <a:endParaRPr/>
+              <a:t>Use </a:t>
+            </a:r>
+            <a:r>
+              <a:rPr lang="en">
+                <a:latin typeface="Consolas"/>
+                <a:ea typeface="Consolas"/>
+                <a:cs typeface="Consolas"/>
+                <a:sym typeface="Consolas"/>
+              </a:rPr>
+              <a:t>lsmeans</a:t>
+            </a:r>
+            <a:r>
+              <a:rPr lang="en">
+                <a:latin typeface="Consolas"/>
+                <a:ea typeface="Consolas"/>
+                <a:cs typeface="Consolas"/>
+                <a:sym typeface="Consolas"/>
+              </a:rPr>
+              <a:t>()</a:t>
+            </a:r>
+            <a:r>
+              <a:rPr lang="en"/>
+              <a:t> and </a:t>
+            </a:r>
+            <a:r>
+              <a:rPr lang="en">
+                <a:latin typeface="Consolas"/>
+                <a:ea typeface="Consolas"/>
+                <a:cs typeface="Consolas"/>
+                <a:sym typeface="Consolas"/>
+              </a:rPr>
+              <a:t>pairs()</a:t>
+            </a:r>
+            <a:r>
+              <a:rPr lang="en"/>
+              <a:t> from package </a:t>
+            </a:r>
+            <a:r>
+              <a:rPr lang="en">
+                <a:latin typeface="Consolas"/>
+                <a:ea typeface="Consolas"/>
+                <a:cs typeface="Consolas"/>
+                <a:sym typeface="Consolas"/>
+              </a:rPr>
+              <a:t>lsmeans</a:t>
+            </a:r>
+            <a:endParaRPr>
+              <a:latin typeface="Consolas"/>
+              <a:ea typeface="Consolas"/>
+              <a:cs typeface="Consolas"/>
+              <a:sym typeface="Consolas"/>
+            </a:endParaRPr>
           </a:p>
           <a:p>
             <a:pPr indent="0" lvl="0" marL="0" rtl="0" algn="l">
@@ -37045,73 +36760,6 @@
             </a:pPr>
             <a:r>
               <a:t/>
-            </a:r>
-            <a:endParaRPr/>
-          </a:p>
-          <a:p>
-            <a:pPr indent="0" lvl="0" marL="0" rtl="0" algn="l">
-              <a:spcBef>
-                <a:spcPts val="1600"/>
-              </a:spcBef>
-              <a:spcAft>
-                <a:spcPts val="0"/>
-              </a:spcAft>
-              <a:buNone/>
-            </a:pPr>
-            <a:r>
-              <a:t/>
-            </a:r>
-            <a:endParaRPr/>
-          </a:p>
-          <a:p>
-            <a:pPr indent="0" lvl="0" marL="0" rtl="0" algn="l">
-              <a:spcBef>
-                <a:spcPts val="1600"/>
-              </a:spcBef>
-              <a:spcAft>
-                <a:spcPts val="0"/>
-              </a:spcAft>
-              <a:buNone/>
-            </a:pPr>
-            <a:r>
-              <a:rPr lang="en" sz="1150">
-                <a:solidFill>
-                  <a:srgbClr val="3A3A3A"/>
-                </a:solidFill>
-              </a:rPr>
-              <a:t>Torsten Hothorn, Frank Bretz and Peter Westfall (2008), Simultaneous Inference in General Parametric Models. </a:t>
-            </a:r>
-            <a:r>
-              <a:rPr i="1" lang="en" sz="1150">
-                <a:solidFill>
-                  <a:srgbClr val="3A3A3A"/>
-                </a:solidFill>
-              </a:rPr>
-              <a:t>Biometrical Journal</a:t>
-            </a:r>
-            <a:r>
-              <a:rPr lang="en" sz="1150">
-                <a:solidFill>
-                  <a:srgbClr val="3A3A3A"/>
-                </a:solidFill>
-              </a:rPr>
-              <a:t>, </a:t>
-            </a:r>
-            <a:r>
-              <a:rPr b="1" lang="en" sz="1150">
-                <a:solidFill>
-                  <a:srgbClr val="3A3A3A"/>
-                </a:solidFill>
-              </a:rPr>
-              <a:t>50</a:t>
-            </a:r>
-            <a:r>
-              <a:rPr lang="en" sz="1150">
-                <a:solidFill>
-                  <a:srgbClr val="3A3A3A"/>
-                </a:solidFill>
-              </a:rPr>
-              <a:t>(3), 346--363</a:t>
             </a:r>
             <a:endParaRPr/>
           </a:p>
@@ -37744,7 +37392,102 @@
             </a:pPr>
             <a:r>
               <a:rPr lang="en"/>
-              <a:t>T-tests, ANOVA and regression are fundamentally the same, collectively called  ‘general linear models’. They can be carried out in R with lm()</a:t>
+              <a:t>T-tests, ANOVA and regression are fundamentally the same, collectively called  ‘general linear models’. Other general linear models are possible. They can be carried out in R with </a:t>
+            </a:r>
+            <a:r>
+              <a:rPr lang="en">
+                <a:latin typeface="Consolas"/>
+                <a:ea typeface="Consolas"/>
+                <a:cs typeface="Consolas"/>
+                <a:sym typeface="Consolas"/>
+              </a:rPr>
+              <a:t>lm()</a:t>
+            </a:r>
+            <a:endParaRPr>
+              <a:latin typeface="Consolas"/>
+              <a:ea typeface="Consolas"/>
+              <a:cs typeface="Consolas"/>
+              <a:sym typeface="Consolas"/>
+            </a:endParaRPr>
+          </a:p>
+          <a:p>
+            <a:pPr indent="0" lvl="0" marL="0" rtl="0" algn="l">
+              <a:spcBef>
+                <a:spcPts val="1600"/>
+              </a:spcBef>
+              <a:spcAft>
+                <a:spcPts val="0"/>
+              </a:spcAft>
+              <a:buNone/>
+            </a:pPr>
+            <a:r>
+              <a:rPr lang="en"/>
+              <a:t>The concept can be extended to ‘generalised linear models’ for different types of response. Generalised linear models are carried out in R with </a:t>
+            </a:r>
+            <a:r>
+              <a:rPr lang="en">
+                <a:latin typeface="Consolas"/>
+                <a:ea typeface="Consolas"/>
+                <a:cs typeface="Consolas"/>
+                <a:sym typeface="Consolas"/>
+              </a:rPr>
+              <a:t>glm()</a:t>
+            </a:r>
+            <a:endParaRPr>
+              <a:latin typeface="Consolas"/>
+              <a:ea typeface="Consolas"/>
+              <a:cs typeface="Consolas"/>
+              <a:sym typeface="Consolas"/>
+            </a:endParaRPr>
+          </a:p>
+          <a:p>
+            <a:pPr indent="0" lvl="0" marL="0" rtl="0" algn="l">
+              <a:spcBef>
+                <a:spcPts val="1600"/>
+              </a:spcBef>
+              <a:spcAft>
+                <a:spcPts val="0"/>
+              </a:spcAft>
+              <a:buNone/>
+            </a:pPr>
+            <a:r>
+              <a:rPr lang="en"/>
+              <a:t>The output of </a:t>
+            </a:r>
+            <a:r>
+              <a:rPr lang="en">
+                <a:latin typeface="Consolas"/>
+                <a:ea typeface="Consolas"/>
+                <a:cs typeface="Consolas"/>
+                <a:sym typeface="Consolas"/>
+              </a:rPr>
+              <a:t>lm()</a:t>
+            </a:r>
+            <a:r>
+              <a:rPr lang="en"/>
+              <a:t> looks more complex, at first, than the outputs of </a:t>
+            </a:r>
+            <a:r>
+              <a:rPr lang="en">
+                <a:latin typeface="Consolas"/>
+                <a:ea typeface="Consolas"/>
+                <a:cs typeface="Consolas"/>
+                <a:sym typeface="Consolas"/>
+              </a:rPr>
+              <a:t>t.test()</a:t>
+            </a:r>
+            <a:r>
+              <a:rPr lang="en"/>
+              <a:t> and </a:t>
+            </a:r>
+            <a:r>
+              <a:rPr lang="en">
+                <a:latin typeface="Consolas"/>
+                <a:ea typeface="Consolas"/>
+                <a:cs typeface="Consolas"/>
+                <a:sym typeface="Consolas"/>
+              </a:rPr>
+              <a:t>aov()</a:t>
             </a:r>
             <a:endParaRPr/>
           </a:p>
@@ -37754,60 +37497,52 @@
                 <a:spcPts val="1600"/>
               </a:spcBef>
               <a:spcAft>
-                <a:spcPts val="0"/>
+                <a:spcPts val="1600"/>
               </a:spcAft>
               <a:buNone/>
             </a:pPr>
             <a:r>
               <a:rPr lang="en"/>
-              <a:t>The concept can be extended to ‘generalised linear models’ for different types of response. Generalised linear models are carried out in R with glm()</a:t>
-            </a:r>
-            <a:endParaRPr/>
-          </a:p>
-          <a:p>
-            <a:pPr indent="0" lvl="0" marL="0" rtl="0" algn="l">
-              <a:spcBef>
-                <a:spcPts val="1600"/>
-              </a:spcBef>
-              <a:spcAft>
-                <a:spcPts val="0"/>
-              </a:spcAft>
-              <a:buNone/>
-            </a:pPr>
+              <a:t>The output of </a:t>
+            </a:r>
+            <a:r>
+              <a:rPr lang="en">
+                <a:latin typeface="Consolas"/>
+                <a:ea typeface="Consolas"/>
+                <a:cs typeface="Consolas"/>
+                <a:sym typeface="Consolas"/>
+              </a:rPr>
+              <a:t>glm()</a:t>
+            </a:r>
             <a:r>
               <a:rPr lang="en"/>
-              <a:t>The output of lm() looks more complex, at first, than the outputs of t.test() and aov()</a:t>
-            </a:r>
-            <a:endParaRPr/>
-          </a:p>
-          <a:p>
-            <a:pPr indent="0" lvl="0" marL="0" rtl="0" algn="l">
-              <a:spcBef>
-                <a:spcPts val="1600"/>
-              </a:spcBef>
-              <a:spcAft>
-                <a:spcPts val="0"/>
-              </a:spcAft>
-              <a:buNone/>
-            </a:pPr>
+              <a:t> is like that for </a:t>
+            </a:r>
+            <a:r>
+              <a:rPr lang="en">
+                <a:latin typeface="Consolas"/>
+                <a:ea typeface="Consolas"/>
+                <a:cs typeface="Consolas"/>
+                <a:sym typeface="Consolas"/>
+              </a:rPr>
+              <a:t>lm()</a:t>
+            </a:r>
             <a:r>
               <a:rPr lang="en"/>
-              <a:t>The output of glm() is like that for lm(). So we will revisit regression, t-tests and ANOVA using lm() to help you understand the output </a:t>
-            </a:r>
-            <a:endParaRPr/>
-          </a:p>
-          <a:p>
-            <a:pPr indent="0" lvl="0" marL="0" rtl="0" algn="l">
-              <a:spcBef>
-                <a:spcPts val="1600"/>
-              </a:spcBef>
-              <a:spcAft>
-                <a:spcPts val="1600"/>
-              </a:spcAft>
-              <a:buNone/>
-            </a:pPr>
-            <a:r>
-              <a:t/>
+              <a:t>. So we will revisit regression, t-tests and ANOVA using </a:t>
+            </a:r>
+            <a:r>
+              <a:rPr lang="en">
+                <a:latin typeface="Consolas"/>
+                <a:ea typeface="Consolas"/>
+                <a:cs typeface="Consolas"/>
+                <a:sym typeface="Consolas"/>
+              </a:rPr>
+              <a:t>lm()</a:t>
+            </a:r>
+            <a:r>
+              <a:rPr lang="en"/>
+              <a:t> to help you understand the output </a:t>
             </a:r>
             <a:endParaRPr/>
           </a:p>
@@ -37955,7 +37690,7 @@
             </a:pPr>
             <a:r>
               <a:rPr lang="en" sz="2000"/>
-              <a:t>Impossible to cover everything to you might ever need!</a:t>
+              <a:t>Impossible to cover everything you might ever need!</a:t>
             </a:r>
             <a:endParaRPr sz="2000"/>
           </a:p>

</xml_diff>